<commit_message>
Heavily refactor and release the going fast post
</commit_message>
<xml_diff>
--- a/post-media/SolidStructure-Refined/_working copies/Solid Structure Table.pptx
+++ b/post-media/SolidStructure-Refined/_working copies/Solid Structure Table.pptx
@@ -270,7 +270,7 @@
           <a:p>
             <a:fld id="{C8935D48-1B7A-4328-8A92-3989B43617AB}" type="datetimeFigureOut">
               <a:rPr lang="en-US" smtClean="0"/>
-              <a:t>12/2/2020</a:t>
+              <a:t>1/24/2021</a:t>
             </a:fld>
             <a:endParaRPr lang="en-US"/>
           </a:p>
@@ -468,7 +468,7 @@
           <a:p>
             <a:fld id="{C8935D48-1B7A-4328-8A92-3989B43617AB}" type="datetimeFigureOut">
               <a:rPr lang="en-US" smtClean="0"/>
-              <a:t>12/2/2020</a:t>
+              <a:t>1/24/2021</a:t>
             </a:fld>
             <a:endParaRPr lang="en-US"/>
           </a:p>
@@ -676,7 +676,7 @@
           <a:p>
             <a:fld id="{C8935D48-1B7A-4328-8A92-3989B43617AB}" type="datetimeFigureOut">
               <a:rPr lang="en-US" smtClean="0"/>
-              <a:t>12/2/2020</a:t>
+              <a:t>1/24/2021</a:t>
             </a:fld>
             <a:endParaRPr lang="en-US"/>
           </a:p>
@@ -874,7 +874,7 @@
           <a:p>
             <a:fld id="{C8935D48-1B7A-4328-8A92-3989B43617AB}" type="datetimeFigureOut">
               <a:rPr lang="en-US" smtClean="0"/>
-              <a:t>12/2/2020</a:t>
+              <a:t>1/24/2021</a:t>
             </a:fld>
             <a:endParaRPr lang="en-US"/>
           </a:p>
@@ -1149,7 +1149,7 @@
           <a:p>
             <a:fld id="{C8935D48-1B7A-4328-8A92-3989B43617AB}" type="datetimeFigureOut">
               <a:rPr lang="en-US" smtClean="0"/>
-              <a:t>12/2/2020</a:t>
+              <a:t>1/24/2021</a:t>
             </a:fld>
             <a:endParaRPr lang="en-US"/>
           </a:p>
@@ -1414,7 +1414,7 @@
           <a:p>
             <a:fld id="{C8935D48-1B7A-4328-8A92-3989B43617AB}" type="datetimeFigureOut">
               <a:rPr lang="en-US" smtClean="0"/>
-              <a:t>12/2/2020</a:t>
+              <a:t>1/24/2021</a:t>
             </a:fld>
             <a:endParaRPr lang="en-US"/>
           </a:p>
@@ -1826,7 +1826,7 @@
           <a:p>
             <a:fld id="{C8935D48-1B7A-4328-8A92-3989B43617AB}" type="datetimeFigureOut">
               <a:rPr lang="en-US" smtClean="0"/>
-              <a:t>12/2/2020</a:t>
+              <a:t>1/24/2021</a:t>
             </a:fld>
             <a:endParaRPr lang="en-US"/>
           </a:p>
@@ -1967,7 +1967,7 @@
           <a:p>
             <a:fld id="{C8935D48-1B7A-4328-8A92-3989B43617AB}" type="datetimeFigureOut">
               <a:rPr lang="en-US" smtClean="0"/>
-              <a:t>12/2/2020</a:t>
+              <a:t>1/24/2021</a:t>
             </a:fld>
             <a:endParaRPr lang="en-US"/>
           </a:p>
@@ -2080,7 +2080,7 @@
           <a:p>
             <a:fld id="{C8935D48-1B7A-4328-8A92-3989B43617AB}" type="datetimeFigureOut">
               <a:rPr lang="en-US" smtClean="0"/>
-              <a:t>12/2/2020</a:t>
+              <a:t>1/24/2021</a:t>
             </a:fld>
             <a:endParaRPr lang="en-US"/>
           </a:p>
@@ -2391,7 +2391,7 @@
           <a:p>
             <a:fld id="{C8935D48-1B7A-4328-8A92-3989B43617AB}" type="datetimeFigureOut">
               <a:rPr lang="en-US" smtClean="0"/>
-              <a:t>12/2/2020</a:t>
+              <a:t>1/24/2021</a:t>
             </a:fld>
             <a:endParaRPr lang="en-US"/>
           </a:p>
@@ -2679,7 +2679,7 @@
           <a:p>
             <a:fld id="{C8935D48-1B7A-4328-8A92-3989B43617AB}" type="datetimeFigureOut">
               <a:rPr lang="en-US" smtClean="0"/>
-              <a:t>12/2/2020</a:t>
+              <a:t>1/24/2021</a:t>
             </a:fld>
             <a:endParaRPr lang="en-US"/>
           </a:p>
@@ -2920,7 +2920,7 @@
           <a:p>
             <a:fld id="{C8935D48-1B7A-4328-8A92-3989B43617AB}" type="datetimeFigureOut">
               <a:rPr lang="en-US" smtClean="0"/>
-              <a:t>12/2/2020</a:t>
+              <a:t>1/24/2021</a:t>
             </a:fld>
             <a:endParaRPr lang="en-US"/>
           </a:p>
@@ -4208,8 +4208,8 @@
         </p:nvSpPr>
         <p:spPr>
           <a:xfrm>
-            <a:off x="1408494" y="5901032"/>
-            <a:ext cx="1148093" cy="415498"/>
+            <a:off x="1408493" y="5901032"/>
+            <a:ext cx="1577985" cy="738664"/>
           </a:xfrm>
           <a:prstGeom prst="rect">
             <a:avLst/>
@@ -4233,6 +4233,18 @@
               <a:t>Strict Separation</a:t>
             </a:r>
           </a:p>
+          <a:p>
+            <a:r>
+              <a:rPr lang="en-US" sz="1050" dirty="0"/>
+              <a:t>Abstract Dependencies</a:t>
+            </a:r>
+          </a:p>
+          <a:p>
+            <a:r>
+              <a:rPr lang="en-US" sz="1050" dirty="0"/>
+              <a:t>Owned Dependencies</a:t>
+            </a:r>
+          </a:p>
         </p:txBody>
       </p:sp>
       <p:sp>
@@ -4250,7 +4262,7 @@
         <p:spPr>
           <a:xfrm>
             <a:off x="8353696" y="5901032"/>
-            <a:ext cx="1228529" cy="415498"/>
+            <a:ext cx="1478201" cy="738664"/>
           </a:xfrm>
           <a:prstGeom prst="rect">
             <a:avLst/>
@@ -4272,6 +4284,18 @@
             <a:r>
               <a:rPr lang="en-US" sz="1050" dirty="0"/>
               <a:t>Loose Separation</a:t>
+            </a:r>
+          </a:p>
+          <a:p>
+            <a:r>
+              <a:rPr lang="en-US" sz="1050" dirty="0"/>
+              <a:t>Concrete Dependencies</a:t>
+            </a:r>
+          </a:p>
+          <a:p>
+            <a:r>
+              <a:rPr lang="en-US" sz="1050" dirty="0"/>
+              <a:t>External Dependencies</a:t>
             </a:r>
           </a:p>
         </p:txBody>

</xml_diff>